<commit_message>
added an empty slide
</commit_message>
<xml_diff>
--- a/gtas.pptx
+++ b/gtas.pptx
@@ -5,10 +5,11 @@
     <p:sldMasterId id="2147483648" r:id="rId1"/>
   </p:sldMasterIdLst>
   <p:notesMasterIdLst>
-    <p:notesMasterId r:id="rId3"/>
+    <p:notesMasterId r:id="rId4"/>
   </p:notesMasterIdLst>
   <p:sldIdLst>
     <p:sldId id="256" r:id="rId2"/>
+    <p:sldId id="257" r:id="rId3"/>
   </p:sldIdLst>
   <p:sldSz cx="9144000" cy="6858000" type="screen4x3"/>
   <p:notesSz cx="6858000" cy="9144000"/>
@@ -193,7 +194,7 @@
             <a:fld id="{1591C4E6-5D61-400F-96E5-313C74F7342E}" type="datetimeFigureOut">
               <a:rPr lang="en-US" smtClean="0"/>
               <a:pPr/>
-              <a:t>2/14/2014</a:t>
+              <a:t>2/18/2014</a:t>
             </a:fld>
             <a:endParaRPr lang="en-US"/>
           </a:p>
@@ -699,7 +700,7 @@
             <a:fld id="{289CCD87-8BC3-4336-A7F3-20020B9B5C75}" type="datetime1">
               <a:rPr lang="en-US" smtClean="0"/>
               <a:pPr/>
-              <a:t>2/14/2014</a:t>
+              <a:t>2/18/2014</a:t>
             </a:fld>
             <a:endParaRPr lang="en-US" dirty="0"/>
           </a:p>
@@ -906,7 +907,7 @@
             <a:fld id="{A0990CD4-924C-45C0-934B-1BF316C930AE}" type="datetime1">
               <a:rPr lang="en-US" smtClean="0"/>
               <a:pPr/>
-              <a:t>2/14/2014</a:t>
+              <a:t>2/18/2014</a:t>
             </a:fld>
             <a:endParaRPr lang="en-US"/>
           </a:p>
@@ -1087,7 +1088,7 @@
             <a:fld id="{3433DB96-1396-4092-8254-A6E2BDE38E9E}" type="datetime1">
               <a:rPr lang="en-US" smtClean="0"/>
               <a:pPr/>
-              <a:t>2/14/2014</a:t>
+              <a:t>2/18/2014</a:t>
             </a:fld>
             <a:endParaRPr lang="en-US"/>
           </a:p>
@@ -1276,7 +1277,7 @@
             <a:fld id="{2B5B3656-7910-4F3C-A707-E1C77E2B0BAD}" type="datetime1">
               <a:rPr lang="en-US" smtClean="0"/>
               <a:pPr/>
-              <a:t>2/14/2014</a:t>
+              <a:t>2/18/2014</a:t>
             </a:fld>
             <a:endParaRPr lang="en-US" dirty="0"/>
           </a:p>
@@ -1559,7 +1560,7 @@
             <a:fld id="{3C23F7EB-4A23-4370-8B59-B76A78D2877D}" type="datetime1">
               <a:rPr lang="en-US" smtClean="0"/>
               <a:pPr/>
-              <a:t>2/14/2014</a:t>
+              <a:t>2/18/2014</a:t>
             </a:fld>
             <a:endParaRPr lang="en-US"/>
           </a:p>
@@ -1848,7 +1849,7 @@
             <a:fld id="{3ADABEB5-7EEA-4E1E-AB93-8E99242B08F2}" type="datetime1">
               <a:rPr lang="en-US" smtClean="0"/>
               <a:pPr/>
-              <a:t>2/14/2014</a:t>
+              <a:t>2/18/2014</a:t>
             </a:fld>
             <a:endParaRPr lang="en-US"/>
           </a:p>
@@ -2271,7 +2272,7 @@
             <a:fld id="{4ACA6750-2A09-4A77-8A86-BBD4094FFB4A}" type="datetime1">
               <a:rPr lang="en-US" smtClean="0"/>
               <a:pPr/>
-              <a:t>2/14/2014</a:t>
+              <a:t>2/18/2014</a:t>
             </a:fld>
             <a:endParaRPr lang="en-US"/>
           </a:p>
@@ -2390,7 +2391,7 @@
             <a:fld id="{2B73118B-EBC1-4AE0-973D-F08049F704A2}" type="datetime1">
               <a:rPr lang="en-US" smtClean="0"/>
               <a:pPr/>
-              <a:t>2/14/2014</a:t>
+              <a:t>2/18/2014</a:t>
             </a:fld>
             <a:endParaRPr lang="en-US"/>
           </a:p>
@@ -2486,7 +2487,7 @@
             <a:fld id="{BDE39723-0F17-4720-B6C1-EBE5737D02AC}" type="datetime1">
               <a:rPr lang="en-US" smtClean="0"/>
               <a:pPr/>
-              <a:t>2/14/2014</a:t>
+              <a:t>2/18/2014</a:t>
             </a:fld>
             <a:endParaRPr lang="en-US"/>
           </a:p>
@@ -2764,7 +2765,7 @@
             <a:fld id="{D8EBACE4-FF17-4D6A-8A98-2B2C593070D6}" type="datetime1">
               <a:rPr lang="en-US" smtClean="0"/>
               <a:pPr/>
-              <a:t>2/14/2014</a:t>
+              <a:t>2/18/2014</a:t>
             </a:fld>
             <a:endParaRPr lang="en-US"/>
           </a:p>
@@ -3018,7 +3019,7 @@
             <a:fld id="{3E2F418A-B4FE-4238-B3C4-ED768C35D73F}" type="datetime1">
               <a:rPr lang="en-US" smtClean="0"/>
               <a:pPr/>
-              <a:t>2/14/2014</a:t>
+              <a:t>2/18/2014</a:t>
             </a:fld>
             <a:endParaRPr lang="en-US"/>
           </a:p>
@@ -3322,7 +3323,7 @@
             <a:fld id="{BAB944AD-5FB9-460D-9924-610B1DC6D97B}" type="datetime1">
               <a:rPr lang="en-US" smtClean="0"/>
               <a:pPr/>
-              <a:t>2/14/2014</a:t>
+              <a:t>2/18/2014</a:t>
             </a:fld>
             <a:endParaRPr lang="en-US" dirty="0"/>
           </a:p>
@@ -3841,6 +3842,116 @@
       </p:par>
     </p:tnLst>
   </p:timing>
+</p:sld>
+</file>
+
+<file path=ppt/slides/slide2.xml><?xml version="1.0" encoding="utf-8"?>
+<p:sld xmlns:a="http://schemas.openxmlformats.org/drawingml/2006/main" xmlns:r="http://schemas.openxmlformats.org/officeDocument/2006/relationships" xmlns:p="http://schemas.openxmlformats.org/presentationml/2006/main">
+  <p:cSld>
+    <p:spTree>
+      <p:nvGrpSpPr>
+        <p:cNvPr id="1" name=""/>
+        <p:cNvGrpSpPr/>
+        <p:nvPr/>
+      </p:nvGrpSpPr>
+      <p:grpSpPr>
+        <a:xfrm>
+          <a:off x="0" y="0"/>
+          <a:ext cx="0" cy="0"/>
+          <a:chOff x="0" y="0"/>
+          <a:chExt cx="0" cy="0"/>
+        </a:xfrm>
+      </p:grpSpPr>
+      <p:sp>
+        <p:nvSpPr>
+          <p:cNvPr id="2" name="1 Título"/>
+          <p:cNvSpPr>
+            <a:spLocks noGrp="1"/>
+          </p:cNvSpPr>
+          <p:nvPr>
+            <p:ph type="title"/>
+          </p:nvPr>
+        </p:nvSpPr>
+        <p:spPr/>
+        <p:txBody>
+          <a:bodyPr/>
+          <a:lstStyle/>
+          <a:p>
+            <a:endParaRPr lang="en-US"/>
+          </a:p>
+        </p:txBody>
+      </p:sp>
+      <p:sp>
+        <p:nvSpPr>
+          <p:cNvPr id="3" name="2 Marcador de contenido"/>
+          <p:cNvSpPr>
+            <a:spLocks noGrp="1"/>
+          </p:cNvSpPr>
+          <p:nvPr>
+            <p:ph idx="1"/>
+          </p:nvPr>
+        </p:nvSpPr>
+        <p:spPr/>
+        <p:txBody>
+          <a:bodyPr/>
+          <a:lstStyle/>
+          <a:p>
+            <a:endParaRPr lang="en-US"/>
+          </a:p>
+        </p:txBody>
+      </p:sp>
+      <p:sp>
+        <p:nvSpPr>
+          <p:cNvPr id="4" name="3 Marcador de pie de página"/>
+          <p:cNvSpPr>
+            <a:spLocks noGrp="1"/>
+          </p:cNvSpPr>
+          <p:nvPr>
+            <p:ph type="ftr" sz="quarter" idx="3"/>
+          </p:nvPr>
+        </p:nvSpPr>
+        <p:spPr/>
+        <p:txBody>
+          <a:bodyPr/>
+          <a:lstStyle/>
+          <a:p>
+            <a:r>
+              <a:rPr lang="es-ES" smtClean="0"/>
+              <a:t>Título en el pie</a:t>
+            </a:r>
+            <a:endParaRPr lang="en-US" dirty="0"/>
+          </a:p>
+        </p:txBody>
+      </p:sp>
+      <p:sp>
+        <p:nvSpPr>
+          <p:cNvPr id="5" name="4 Marcador de número de diapositiva"/>
+          <p:cNvSpPr>
+            <a:spLocks noGrp="1"/>
+          </p:cNvSpPr>
+          <p:nvPr>
+            <p:ph type="sldNum" sz="quarter" idx="4"/>
+          </p:nvPr>
+        </p:nvSpPr>
+        <p:spPr/>
+        <p:txBody>
+          <a:bodyPr/>
+          <a:lstStyle/>
+          <a:p>
+            <a:fld id="{52294C8E-BCE2-4EAA-8FE3-C2FBAE91D9A8}" type="slidenum">
+              <a:rPr lang="en-US" smtClean="0"/>
+              <a:pPr/>
+              <a:t>2</a:t>
+            </a:fld>
+            <a:endParaRPr lang="en-US" dirty="0"/>
+          </a:p>
+        </p:txBody>
+      </p:sp>
+    </p:spTree>
+  </p:cSld>
+  <p:clrMapOvr>
+    <a:masterClrMapping/>
+  </p:clrMapOvr>
 </p:sld>
 </file>
 

</xml_diff>

<commit_message>
Added dark backgrounds to footer elements
to assure they get printed white
</commit_message>
<xml_diff>
--- a/gtas.pptx
+++ b/gtas.pptx
@@ -194,7 +194,7 @@
             <a:fld id="{1591C4E6-5D61-400F-96E5-313C74F7342E}" type="datetimeFigureOut">
               <a:rPr lang="en-US" smtClean="0"/>
               <a:pPr/>
-              <a:t>2/18/2014</a:t>
+              <a:t>2/19/2014</a:t>
             </a:fld>
             <a:endParaRPr lang="en-US"/>
           </a:p>
@@ -682,6 +682,9 @@
           <a:prstGeom prst="rect">
             <a:avLst/>
           </a:prstGeom>
+          <a:solidFill>
+            <a:srgbClr val="003366"/>
+          </a:solidFill>
         </p:spPr>
         <p:txBody>
           <a:bodyPr vert="horz" lIns="91440" tIns="45720" rIns="91440" bIns="45720" rtlCol="0" anchor="ctr"/>
@@ -700,7 +703,7 @@
             <a:fld id="{289CCD87-8BC3-4336-A7F3-20020B9B5C75}" type="datetime1">
               <a:rPr lang="en-US" smtClean="0"/>
               <a:pPr/>
-              <a:t>2/18/2014</a:t>
+              <a:t>2/19/2014</a:t>
             </a:fld>
             <a:endParaRPr lang="en-US" dirty="0"/>
           </a:p>
@@ -724,6 +727,9 @@
           <a:prstGeom prst="rect">
             <a:avLst/>
           </a:prstGeom>
+          <a:solidFill>
+            <a:srgbClr val="003366"/>
+          </a:solidFill>
         </p:spPr>
         <p:txBody>
           <a:bodyPr vert="horz" lIns="91440" tIns="45720" rIns="91440" bIns="45720" rtlCol="0" anchor="ctr"/>
@@ -740,7 +746,7 @@
           </a:lstStyle>
           <a:p>
             <a:r>
-              <a:rPr lang="es-ES" smtClean="0"/>
+              <a:rPr lang="es-ES" dirty="0" smtClean="0"/>
               <a:t>Título en el pie</a:t>
             </a:r>
             <a:endParaRPr lang="en-US" dirty="0"/>
@@ -765,6 +771,9 @@
           <a:prstGeom prst="rect">
             <a:avLst/>
           </a:prstGeom>
+          <a:solidFill>
+            <a:srgbClr val="003366"/>
+          </a:solidFill>
         </p:spPr>
         <p:txBody>
           <a:bodyPr vert="horz" lIns="91440" tIns="45720" rIns="91440" bIns="45720" rtlCol="0" anchor="ctr"/>
@@ -907,7 +916,7 @@
             <a:fld id="{A0990CD4-924C-45C0-934B-1BF316C930AE}" type="datetime1">
               <a:rPr lang="en-US" smtClean="0"/>
               <a:pPr/>
-              <a:t>2/18/2014</a:t>
+              <a:t>2/19/2014</a:t>
             </a:fld>
             <a:endParaRPr lang="en-US"/>
           </a:p>
@@ -1088,7 +1097,7 @@
             <a:fld id="{3433DB96-1396-4092-8254-A6E2BDE38E9E}" type="datetime1">
               <a:rPr lang="en-US" smtClean="0"/>
               <a:pPr/>
-              <a:t>2/18/2014</a:t>
+              <a:t>2/19/2014</a:t>
             </a:fld>
             <a:endParaRPr lang="en-US"/>
           </a:p>
@@ -1277,7 +1286,7 @@
             <a:fld id="{2B5B3656-7910-4F3C-A707-E1C77E2B0BAD}" type="datetime1">
               <a:rPr lang="en-US" smtClean="0"/>
               <a:pPr/>
-              <a:t>2/18/2014</a:t>
+              <a:t>2/19/2014</a:t>
             </a:fld>
             <a:endParaRPr lang="en-US" dirty="0"/>
           </a:p>
@@ -1560,7 +1569,7 @@
             <a:fld id="{3C23F7EB-4A23-4370-8B59-B76A78D2877D}" type="datetime1">
               <a:rPr lang="en-US" smtClean="0"/>
               <a:pPr/>
-              <a:t>2/18/2014</a:t>
+              <a:t>2/19/2014</a:t>
             </a:fld>
             <a:endParaRPr lang="en-US"/>
           </a:p>
@@ -1849,7 +1858,7 @@
             <a:fld id="{3ADABEB5-7EEA-4E1E-AB93-8E99242B08F2}" type="datetime1">
               <a:rPr lang="en-US" smtClean="0"/>
               <a:pPr/>
-              <a:t>2/18/2014</a:t>
+              <a:t>2/19/2014</a:t>
             </a:fld>
             <a:endParaRPr lang="en-US"/>
           </a:p>
@@ -2272,7 +2281,7 @@
             <a:fld id="{4ACA6750-2A09-4A77-8A86-BBD4094FFB4A}" type="datetime1">
               <a:rPr lang="en-US" smtClean="0"/>
               <a:pPr/>
-              <a:t>2/18/2014</a:t>
+              <a:t>2/19/2014</a:t>
             </a:fld>
             <a:endParaRPr lang="en-US"/>
           </a:p>
@@ -2391,7 +2400,7 @@
             <a:fld id="{2B73118B-EBC1-4AE0-973D-F08049F704A2}" type="datetime1">
               <a:rPr lang="en-US" smtClean="0"/>
               <a:pPr/>
-              <a:t>2/18/2014</a:t>
+              <a:t>2/19/2014</a:t>
             </a:fld>
             <a:endParaRPr lang="en-US"/>
           </a:p>
@@ -2487,7 +2496,7 @@
             <a:fld id="{BDE39723-0F17-4720-B6C1-EBE5737D02AC}" type="datetime1">
               <a:rPr lang="en-US" smtClean="0"/>
               <a:pPr/>
-              <a:t>2/18/2014</a:t>
+              <a:t>2/19/2014</a:t>
             </a:fld>
             <a:endParaRPr lang="en-US"/>
           </a:p>
@@ -2765,7 +2774,7 @@
             <a:fld id="{D8EBACE4-FF17-4D6A-8A98-2B2C593070D6}" type="datetime1">
               <a:rPr lang="en-US" smtClean="0"/>
               <a:pPr/>
-              <a:t>2/18/2014</a:t>
+              <a:t>2/19/2014</a:t>
             </a:fld>
             <a:endParaRPr lang="en-US"/>
           </a:p>
@@ -3019,7 +3028,7 @@
             <a:fld id="{3E2F418A-B4FE-4238-B3C4-ED768C35D73F}" type="datetime1">
               <a:rPr lang="en-US" smtClean="0"/>
               <a:pPr/>
-              <a:t>2/18/2014</a:t>
+              <a:t>2/19/2014</a:t>
             </a:fld>
             <a:endParaRPr lang="en-US"/>
           </a:p>
@@ -3305,6 +3314,9 @@
           <a:prstGeom prst="rect">
             <a:avLst/>
           </a:prstGeom>
+          <a:solidFill>
+            <a:srgbClr val="003366"/>
+          </a:solidFill>
         </p:spPr>
         <p:txBody>
           <a:bodyPr vert="horz" lIns="91440" tIns="45720" rIns="91440" bIns="45720" rtlCol="0" anchor="ctr"/>
@@ -3323,7 +3335,7 @@
             <a:fld id="{BAB944AD-5FB9-460D-9924-610B1DC6D97B}" type="datetime1">
               <a:rPr lang="en-US" smtClean="0"/>
               <a:pPr/>
-              <a:t>2/18/2014</a:t>
+              <a:t>2/19/2014</a:t>
             </a:fld>
             <a:endParaRPr lang="en-US" dirty="0"/>
           </a:p>
@@ -3347,6 +3359,9 @@
           <a:prstGeom prst="rect">
             <a:avLst/>
           </a:prstGeom>
+          <a:solidFill>
+            <a:srgbClr val="003366"/>
+          </a:solidFill>
         </p:spPr>
         <p:txBody>
           <a:bodyPr vert="horz" lIns="91440" tIns="45720" rIns="91440" bIns="45720" rtlCol="0" anchor="ctr"/>
@@ -3363,7 +3378,7 @@
           </a:lstStyle>
           <a:p>
             <a:r>
-              <a:rPr lang="es-ES" smtClean="0"/>
+              <a:rPr lang="es-ES" dirty="0" smtClean="0"/>
               <a:t>Título en el pie</a:t>
             </a:r>
             <a:endParaRPr lang="en-US" dirty="0"/>
@@ -3388,6 +3403,9 @@
           <a:prstGeom prst="rect">
             <a:avLst/>
           </a:prstGeom>
+          <a:solidFill>
+            <a:srgbClr val="003366"/>
+          </a:solidFill>
         </p:spPr>
         <p:txBody>
           <a:bodyPr vert="horz" lIns="91440" tIns="45720" rIns="91440" bIns="45720" rtlCol="0" anchor="ctr"/>

</xml_diff>